<commit_message>
Update Vlab location after move to the Cloud, staff listing and leadership changes
</commit_message>
<xml_diff>
--- a/emc/documents/EMC-org.pptx
+++ b/emc/documents/EMC-org.pptx
@@ -303,7 +303,7 @@
           <a:p>
             <a:fld id="{AA53F717-D18A-4F7F-96E1-818ACF46DD82}" type="datetimeFigureOut">
               <a:rPr lang="en-US" smtClean="0"/>
-              <a:t>12/17/2020</a:t>
+              <a:t>5/24/2021</a:t>
             </a:fld>
             <a:endParaRPr lang="en-US"/>
           </a:p>
@@ -471,7 +471,7 @@
           <a:p>
             <a:fld id="{AA53F717-D18A-4F7F-96E1-818ACF46DD82}" type="datetimeFigureOut">
               <a:rPr lang="en-US" smtClean="0"/>
-              <a:t>12/17/2020</a:t>
+              <a:t>5/24/2021</a:t>
             </a:fld>
             <a:endParaRPr lang="en-US"/>
           </a:p>
@@ -649,7 +649,7 @@
           <a:p>
             <a:fld id="{AA53F717-D18A-4F7F-96E1-818ACF46DD82}" type="datetimeFigureOut">
               <a:rPr lang="en-US" smtClean="0"/>
-              <a:t>12/17/2020</a:t>
+              <a:t>5/24/2021</a:t>
             </a:fld>
             <a:endParaRPr lang="en-US"/>
           </a:p>
@@ -817,7 +817,7 @@
           <a:p>
             <a:fld id="{AA53F717-D18A-4F7F-96E1-818ACF46DD82}" type="datetimeFigureOut">
               <a:rPr lang="en-US" smtClean="0"/>
-              <a:t>12/17/2020</a:t>
+              <a:t>5/24/2021</a:t>
             </a:fld>
             <a:endParaRPr lang="en-US"/>
           </a:p>
@@ -1062,7 +1062,7 @@
           <a:p>
             <a:fld id="{AA53F717-D18A-4F7F-96E1-818ACF46DD82}" type="datetimeFigureOut">
               <a:rPr lang="en-US" smtClean="0"/>
-              <a:t>12/17/2020</a:t>
+              <a:t>5/24/2021</a:t>
             </a:fld>
             <a:endParaRPr lang="en-US"/>
           </a:p>
@@ -1347,7 +1347,7 @@
           <a:p>
             <a:fld id="{AA53F717-D18A-4F7F-96E1-818ACF46DD82}" type="datetimeFigureOut">
               <a:rPr lang="en-US" smtClean="0"/>
-              <a:t>12/17/2020</a:t>
+              <a:t>5/24/2021</a:t>
             </a:fld>
             <a:endParaRPr lang="en-US"/>
           </a:p>
@@ -1766,7 +1766,7 @@
           <a:p>
             <a:fld id="{AA53F717-D18A-4F7F-96E1-818ACF46DD82}" type="datetimeFigureOut">
               <a:rPr lang="en-US" smtClean="0"/>
-              <a:t>12/17/2020</a:t>
+              <a:t>5/24/2021</a:t>
             </a:fld>
             <a:endParaRPr lang="en-US"/>
           </a:p>
@@ -1883,7 +1883,7 @@
           <a:p>
             <a:fld id="{AA53F717-D18A-4F7F-96E1-818ACF46DD82}" type="datetimeFigureOut">
               <a:rPr lang="en-US" smtClean="0"/>
-              <a:t>12/17/2020</a:t>
+              <a:t>5/24/2021</a:t>
             </a:fld>
             <a:endParaRPr lang="en-US"/>
           </a:p>
@@ -1978,7 +1978,7 @@
           <a:p>
             <a:fld id="{AA53F717-D18A-4F7F-96E1-818ACF46DD82}" type="datetimeFigureOut">
               <a:rPr lang="en-US" smtClean="0"/>
-              <a:t>12/17/2020</a:t>
+              <a:t>5/24/2021</a:t>
             </a:fld>
             <a:endParaRPr lang="en-US"/>
           </a:p>
@@ -2253,7 +2253,7 @@
           <a:p>
             <a:fld id="{AA53F717-D18A-4F7F-96E1-818ACF46DD82}" type="datetimeFigureOut">
               <a:rPr lang="en-US" smtClean="0"/>
-              <a:t>12/17/2020</a:t>
+              <a:t>5/24/2021</a:t>
             </a:fld>
             <a:endParaRPr lang="en-US"/>
           </a:p>
@@ -2505,7 +2505,7 @@
           <a:p>
             <a:fld id="{AA53F717-D18A-4F7F-96E1-818ACF46DD82}" type="datetimeFigureOut">
               <a:rPr lang="en-US" smtClean="0"/>
-              <a:t>12/17/2020</a:t>
+              <a:t>5/24/2021</a:t>
             </a:fld>
             <a:endParaRPr lang="en-US"/>
           </a:p>
@@ -2716,7 +2716,7 @@
           <a:p>
             <a:fld id="{AA53F717-D18A-4F7F-96E1-818ACF46DD82}" type="datetimeFigureOut">
               <a:rPr lang="en-US" smtClean="0"/>
-              <a:t>12/17/2020</a:t>
+              <a:t>5/24/2021</a:t>
             </a:fld>
             <a:endParaRPr lang="en-US"/>
           </a:p>
@@ -3734,7 +3734,7 @@
         <p:spPr>
           <a:xfrm>
             <a:off x="6858000" y="6477000"/>
-            <a:ext cx="1965603" cy="369332"/>
+            <a:ext cx="1400255" cy="369332"/>
           </a:xfrm>
           <a:prstGeom prst="rect">
             <a:avLst/>
@@ -3749,12 +3749,9 @@
           <a:p>
             <a:r>
               <a:rPr lang="en-US"/>
-              <a:t>20 December </a:t>
-            </a:r>
-            <a:r>
-              <a:rPr lang="en-US" dirty="0"/>
-              <a:t>2020</a:t>
-            </a:r>
+              <a:t>24 May 2021</a:t>
+            </a:r>
+            <a:endParaRPr lang="en-US" dirty="0"/>
           </a:p>
         </p:txBody>
       </p:sp>
@@ -3802,7 +3799,7 @@
         <p:spPr>
           <a:xfrm>
             <a:off x="6934200" y="1230868"/>
-            <a:ext cx="2162259" cy="369332"/>
+            <a:ext cx="1304331" cy="369332"/>
           </a:xfrm>
           <a:prstGeom prst="rect">
             <a:avLst/>
@@ -3825,15 +3822,7 @@
           <a:p>
             <a:r>
               <a:rPr lang="en-US" dirty="0"/>
-              <a:t>XO: Rochelle </a:t>
-            </a:r>
-            <a:r>
-              <a:rPr lang="en-US" dirty="0" err="1"/>
-              <a:t>Bakare</a:t>
-            </a:r>
-            <a:r>
-              <a:rPr lang="en-US" dirty="0"/>
-              <a:t>  </a:t>
+              <a:t>XO: Vacant  </a:t>
             </a:r>
           </a:p>
         </p:txBody>

</xml_diff>